<commit_message>
Add 'end of project' page to final report
</commit_message>
<xml_diff>
--- a/project/projec-final-report.pptx
+++ b/project/projec-final-report.pptx
@@ -14,7 +14,8 @@
     <p:sldId id="262" r:id="rId8"/>
     <p:sldId id="263" r:id="rId9"/>
     <p:sldId id="268" r:id="rId10"/>
-    <p:sldId id="259" r:id="rId11"/>
+    <p:sldId id="269" r:id="rId11"/>
+    <p:sldId id="259" r:id="rId12"/>
   </p:sldIdLst>
   <p:sldSz cx="12192000" cy="6858000"/>
   <p:notesSz cx="6858000" cy="9144000"/>
@@ -270,7 +271,7 @@
           <a:p>
             <a:fld id="{CF44EE85-4902-A94E-85D4-B339588A8421}" type="datetimeFigureOut">
               <a:rPr kumimoji="1" lang="ko-Kore-KR" altLang="en-US" smtClean="0"/>
-              <a:t>2020. 12. 12.</a:t>
+              <a:t>2020. 12. 17.</a:t>
             </a:fld>
             <a:endParaRPr kumimoji="1" lang="ko-Kore-KR" altLang="en-US"/>
           </a:p>
@@ -470,7 +471,7 @@
           <a:p>
             <a:fld id="{CF44EE85-4902-A94E-85D4-B339588A8421}" type="datetimeFigureOut">
               <a:rPr kumimoji="1" lang="ko-Kore-KR" altLang="en-US" smtClean="0"/>
-              <a:t>2020. 12. 12.</a:t>
+              <a:t>2020. 12. 17.</a:t>
             </a:fld>
             <a:endParaRPr kumimoji="1" lang="ko-Kore-KR" altLang="en-US"/>
           </a:p>
@@ -680,7 +681,7 @@
           <a:p>
             <a:fld id="{CF44EE85-4902-A94E-85D4-B339588A8421}" type="datetimeFigureOut">
               <a:rPr kumimoji="1" lang="ko-Kore-KR" altLang="en-US" smtClean="0"/>
-              <a:t>2020. 12. 12.</a:t>
+              <a:t>2020. 12. 17.</a:t>
             </a:fld>
             <a:endParaRPr kumimoji="1" lang="ko-Kore-KR" altLang="en-US"/>
           </a:p>
@@ -880,7 +881,7 @@
           <a:p>
             <a:fld id="{CF44EE85-4902-A94E-85D4-B339588A8421}" type="datetimeFigureOut">
               <a:rPr kumimoji="1" lang="ko-Kore-KR" altLang="en-US" smtClean="0"/>
-              <a:t>2020. 12. 12.</a:t>
+              <a:t>2020. 12. 17.</a:t>
             </a:fld>
             <a:endParaRPr kumimoji="1" lang="ko-Kore-KR" altLang="en-US"/>
           </a:p>
@@ -1156,7 +1157,7 @@
           <a:p>
             <a:fld id="{CF44EE85-4902-A94E-85D4-B339588A8421}" type="datetimeFigureOut">
               <a:rPr kumimoji="1" lang="ko-Kore-KR" altLang="en-US" smtClean="0"/>
-              <a:t>2020. 12. 12.</a:t>
+              <a:t>2020. 12. 17.</a:t>
             </a:fld>
             <a:endParaRPr kumimoji="1" lang="ko-Kore-KR" altLang="en-US"/>
           </a:p>
@@ -1424,7 +1425,7 @@
           <a:p>
             <a:fld id="{CF44EE85-4902-A94E-85D4-B339588A8421}" type="datetimeFigureOut">
               <a:rPr kumimoji="1" lang="ko-Kore-KR" altLang="en-US" smtClean="0"/>
-              <a:t>2020. 12. 12.</a:t>
+              <a:t>2020. 12. 17.</a:t>
             </a:fld>
             <a:endParaRPr kumimoji="1" lang="ko-Kore-KR" altLang="en-US"/>
           </a:p>
@@ -1839,7 +1840,7 @@
           <a:p>
             <a:fld id="{CF44EE85-4902-A94E-85D4-B339588A8421}" type="datetimeFigureOut">
               <a:rPr kumimoji="1" lang="ko-Kore-KR" altLang="en-US" smtClean="0"/>
-              <a:t>2020. 12. 12.</a:t>
+              <a:t>2020. 12. 17.</a:t>
             </a:fld>
             <a:endParaRPr kumimoji="1" lang="ko-Kore-KR" altLang="en-US"/>
           </a:p>
@@ -1981,7 +1982,7 @@
           <a:p>
             <a:fld id="{CF44EE85-4902-A94E-85D4-B339588A8421}" type="datetimeFigureOut">
               <a:rPr kumimoji="1" lang="ko-Kore-KR" altLang="en-US" smtClean="0"/>
-              <a:t>2020. 12. 12.</a:t>
+              <a:t>2020. 12. 17.</a:t>
             </a:fld>
             <a:endParaRPr kumimoji="1" lang="ko-Kore-KR" altLang="en-US"/>
           </a:p>
@@ -2094,7 +2095,7 @@
           <a:p>
             <a:fld id="{CF44EE85-4902-A94E-85D4-B339588A8421}" type="datetimeFigureOut">
               <a:rPr kumimoji="1" lang="ko-Kore-KR" altLang="en-US" smtClean="0"/>
-              <a:t>2020. 12. 12.</a:t>
+              <a:t>2020. 12. 17.</a:t>
             </a:fld>
             <a:endParaRPr kumimoji="1" lang="ko-Kore-KR" altLang="en-US"/>
           </a:p>
@@ -2407,7 +2408,7 @@
           <a:p>
             <a:fld id="{CF44EE85-4902-A94E-85D4-B339588A8421}" type="datetimeFigureOut">
               <a:rPr kumimoji="1" lang="ko-Kore-KR" altLang="en-US" smtClean="0"/>
-              <a:t>2020. 12. 12.</a:t>
+              <a:t>2020. 12. 17.</a:t>
             </a:fld>
             <a:endParaRPr kumimoji="1" lang="ko-Kore-KR" altLang="en-US"/>
           </a:p>
@@ -2696,7 +2697,7 @@
           <a:p>
             <a:fld id="{CF44EE85-4902-A94E-85D4-B339588A8421}" type="datetimeFigureOut">
               <a:rPr kumimoji="1" lang="ko-Kore-KR" altLang="en-US" smtClean="0"/>
-              <a:t>2020. 12. 12.</a:t>
+              <a:t>2020. 12. 17.</a:t>
             </a:fld>
             <a:endParaRPr kumimoji="1" lang="ko-Kore-KR" altLang="en-US"/>
           </a:p>
@@ -2939,7 +2940,7 @@
           <a:p>
             <a:fld id="{CF44EE85-4902-A94E-85D4-B339588A8421}" type="datetimeFigureOut">
               <a:rPr kumimoji="1" lang="ko-Kore-KR" altLang="en-US" smtClean="0"/>
-              <a:t>2020. 12. 12.</a:t>
+              <a:t>2020. 12. 17.</a:t>
             </a:fld>
             <a:endParaRPr kumimoji="1" lang="ko-Kore-KR" altLang="en-US"/>
           </a:p>
@@ -3461,6 +3462,194 @@
 </file>
 
 <file path=ppt/slides/slide10.xml><?xml version="1.0" encoding="utf-8"?>
+<p:sld xmlns:a="http://schemas.openxmlformats.org/drawingml/2006/main" xmlns:r="http://schemas.openxmlformats.org/officeDocument/2006/relationships" xmlns:p="http://schemas.openxmlformats.org/presentationml/2006/main">
+  <p:cSld>
+    <p:spTree>
+      <p:nvGrpSpPr>
+        <p:cNvPr id="1" name=""/>
+        <p:cNvGrpSpPr/>
+        <p:nvPr/>
+      </p:nvGrpSpPr>
+      <p:grpSpPr>
+        <a:xfrm>
+          <a:off x="0" y="0"/>
+          <a:ext cx="0" cy="0"/>
+          <a:chOff x="0" y="0"/>
+          <a:chExt cx="0" cy="0"/>
+        </a:xfrm>
+      </p:grpSpPr>
+      <p:sp>
+        <p:nvSpPr>
+          <p:cNvPr id="2" name="제목 1">
+            <a:extLst>
+              <a:ext uri="{FF2B5EF4-FFF2-40B4-BE49-F238E27FC236}">
+                <a16:creationId xmlns:a16="http://schemas.microsoft.com/office/drawing/2014/main" id="{9F88C685-17F4-2446-9AF1-0B0EECD1D6FA}"/>
+              </a:ext>
+            </a:extLst>
+          </p:cNvPr>
+          <p:cNvSpPr>
+            <a:spLocks noGrp="1"/>
+          </p:cNvSpPr>
+          <p:nvPr>
+            <p:ph type="title"/>
+          </p:nvPr>
+        </p:nvSpPr>
+        <p:spPr/>
+        <p:txBody>
+          <a:bodyPr/>
+          <a:lstStyle/>
+          <a:p>
+            <a:r>
+              <a:rPr kumimoji="1" lang="en-US" altLang="ko-Kore-KR" b="1" dirty="0"/>
+              <a:t>End of project</a:t>
+            </a:r>
+            <a:endParaRPr kumimoji="1" lang="ko-Kore-KR" altLang="en-US" b="1" dirty="0"/>
+          </a:p>
+        </p:txBody>
+      </p:sp>
+      <p:sp>
+        <p:nvSpPr>
+          <p:cNvPr id="3" name="내용 개체 틀 2">
+            <a:extLst>
+              <a:ext uri="{FF2B5EF4-FFF2-40B4-BE49-F238E27FC236}">
+                <a16:creationId xmlns:a16="http://schemas.microsoft.com/office/drawing/2014/main" id="{DBD234CA-4500-EE4E-BBFF-C9FCC261C24C}"/>
+              </a:ext>
+            </a:extLst>
+          </p:cNvPr>
+          <p:cNvSpPr>
+            <a:spLocks noGrp="1"/>
+          </p:cNvSpPr>
+          <p:nvPr>
+            <p:ph idx="1"/>
+          </p:nvPr>
+        </p:nvSpPr>
+        <p:spPr>
+          <a:xfrm>
+            <a:off x="838200" y="1825625"/>
+            <a:ext cx="10515600" cy="4667250"/>
+          </a:xfrm>
+        </p:spPr>
+        <p:txBody>
+          <a:bodyPr>
+            <a:normAutofit fontScale="85000" lnSpcReduction="20000"/>
+          </a:bodyPr>
+          <a:lstStyle/>
+          <a:p>
+            <a:pPr marL="0" indent="0">
+              <a:buNone/>
+            </a:pPr>
+            <a:r>
+              <a:rPr kumimoji="1" lang="en-US" altLang="ko-Kore-KR" b="1" dirty="0"/>
+              <a:t>What I’ve learned</a:t>
+            </a:r>
+          </a:p>
+          <a:p>
+            <a:r>
+              <a:rPr kumimoji="1" lang="en-US" altLang="ko-Kore-KR" dirty="0"/>
+              <a:t>(+) Documentation matters</a:t>
+            </a:r>
+          </a:p>
+          <a:p>
+            <a:pPr lvl="1"/>
+            <a:r>
+              <a:rPr kumimoji="1" lang="en-US" altLang="ko-Kore-KR" dirty="0" err="1"/>
+              <a:t>todos</a:t>
+            </a:r>
+            <a:r>
+              <a:rPr kumimoji="1" lang="en-US" altLang="ko-Kore-KR" dirty="0"/>
+              <a:t>, temporal notes, design doc helped to reduce confusions.</a:t>
+            </a:r>
+          </a:p>
+          <a:p>
+            <a:r>
+              <a:rPr kumimoji="1" lang="en-US" altLang="ko-Kore-KR" dirty="0"/>
+              <a:t>(+) Small size commits</a:t>
+            </a:r>
+          </a:p>
+          <a:p>
+            <a:pPr lvl="1"/>
+            <a:r>
+              <a:rPr kumimoji="1" lang="en-US" altLang="ko-Kore-KR" dirty="0"/>
+              <a:t>Easy to rollback, Less debugging time, Easy to understand current situation.</a:t>
+            </a:r>
+          </a:p>
+          <a:p>
+            <a:r>
+              <a:rPr kumimoji="1" lang="en-US" altLang="ko-Kore-KR" dirty="0"/>
+              <a:t>(-) Underestimated schedule</a:t>
+            </a:r>
+          </a:p>
+          <a:p>
+            <a:r>
+              <a:rPr kumimoji="1" lang="en-US" altLang="ko-Kore-KR" dirty="0"/>
+              <a:t>(-) Absence of test code</a:t>
+            </a:r>
+          </a:p>
+          <a:p>
+            <a:r>
+              <a:rPr kumimoji="1" lang="en-US" altLang="ko-Kore-KR" dirty="0"/>
+              <a:t>(-) Need refactoring : Using lint, prettier Tool</a:t>
+            </a:r>
+          </a:p>
+          <a:p>
+            <a:pPr marL="0" indent="0">
+              <a:buNone/>
+            </a:pPr>
+            <a:endParaRPr kumimoji="1" lang="en-US" altLang="ko-Kore-KR" dirty="0"/>
+          </a:p>
+          <a:p>
+            <a:pPr marL="0" indent="0">
+              <a:buNone/>
+            </a:pPr>
+            <a:r>
+              <a:rPr kumimoji="1" lang="en-US" altLang="ko-Kore-KR" b="1" dirty="0"/>
+              <a:t>Trouble Shooting</a:t>
+            </a:r>
+          </a:p>
+          <a:p>
+            <a:r>
+              <a:rPr kumimoji="1" lang="en-US" altLang="ko-Kore-KR" dirty="0"/>
+              <a:t>‘</a:t>
+            </a:r>
+            <a:r>
+              <a:rPr kumimoji="1" lang="en-US" altLang="ko-Kore-KR" dirty="0" err="1"/>
+              <a:t>Gensort</a:t>
+            </a:r>
+            <a:r>
+              <a:rPr kumimoji="1" lang="en-US" altLang="ko-Kore-KR" dirty="0"/>
+              <a:t>’ not working on MacOS</a:t>
+            </a:r>
+          </a:p>
+          <a:p>
+            <a:pPr lvl="1"/>
+            <a:r>
+              <a:rPr kumimoji="1" lang="en-US" altLang="ko-Kore-KR" dirty="0"/>
+              <a:t>Run ubuntu machine via Docker and generate data files to mounted volume.</a:t>
+            </a:r>
+          </a:p>
+          <a:p>
+            <a:pPr lvl="1"/>
+            <a:r>
+              <a:rPr kumimoji="1" lang="en-US" altLang="ko-Kore-KR" dirty="0"/>
+              <a:t>This should be announced before the project begin, if needed.</a:t>
+            </a:r>
+          </a:p>
+        </p:txBody>
+      </p:sp>
+    </p:spTree>
+    <p:extLst>
+      <p:ext uri="{BB962C8B-B14F-4D97-AF65-F5344CB8AC3E}">
+        <p14:creationId xmlns:p14="http://schemas.microsoft.com/office/powerpoint/2010/main" val="4130653741"/>
+      </p:ext>
+    </p:extLst>
+  </p:cSld>
+  <p:clrMapOvr>
+    <a:masterClrMapping/>
+  </p:clrMapOvr>
+</p:sld>
+</file>
+
+<file path=ppt/slides/slide11.xml><?xml version="1.0" encoding="utf-8"?>
 <p:sld xmlns:a="http://schemas.openxmlformats.org/drawingml/2006/main" xmlns:r="http://schemas.openxmlformats.org/officeDocument/2006/relationships" xmlns:p="http://schemas.openxmlformats.org/presentationml/2006/main">
   <p:cSld>
     <p:spTree>

</xml_diff>